<commit_message>
update presentation and gitignore
</commit_message>
<xml_diff>
--- a/presentations/0522.pptx
+++ b/presentations/0522.pptx
@@ -298,7 +298,7 @@
               <a:pPr>
                 <a:defRPr/>
               </a:pPr>
-              <a:t>20/05/2019</a:t>
+              <a:t>22/05/2019</a:t>
             </a:fld>
             <a:endParaRPr lang="en-GB" dirty="0"/>
           </a:p>
@@ -517,7 +517,7 @@
               <a:pPr>
                 <a:defRPr/>
               </a:pPr>
-              <a:t>20/05/2019</a:t>
+              <a:t>22/05/2019</a:t>
             </a:fld>
             <a:endParaRPr lang="en-GB"/>
           </a:p>
@@ -948,6 +948,107 @@
 </p:notes>
 </file>
 
+<file path=ppt/notesSlides/notesSlide2.xml><?xml version="1.0" encoding="utf-8"?>
+<p:notes xmlns:a="http://schemas.openxmlformats.org/drawingml/2006/main" xmlns:r="http://schemas.openxmlformats.org/officeDocument/2006/relationships" xmlns:p="http://schemas.openxmlformats.org/presentationml/2006/main">
+  <p:cSld>
+    <p:spTree>
+      <p:nvGrpSpPr>
+        <p:cNvPr id="1" name=""/>
+        <p:cNvGrpSpPr/>
+        <p:nvPr/>
+      </p:nvGrpSpPr>
+      <p:grpSpPr>
+        <a:xfrm>
+          <a:off x="0" y="0"/>
+          <a:ext cx="0" cy="0"/>
+          <a:chOff x="0" y="0"/>
+          <a:chExt cx="0" cy="0"/>
+        </a:xfrm>
+      </p:grpSpPr>
+      <p:sp>
+        <p:nvSpPr>
+          <p:cNvPr id="2" name="Folienbildplatzhalter 1"/>
+          <p:cNvSpPr>
+            <a:spLocks noGrp="1" noRot="1" noChangeAspect="1"/>
+          </p:cNvSpPr>
+          <p:nvPr>
+            <p:ph type="sldImg"/>
+          </p:nvPr>
+        </p:nvSpPr>
+        <p:spPr/>
+      </p:sp>
+      <p:sp>
+        <p:nvSpPr>
+          <p:cNvPr id="3" name="Notizenplatzhalter 2"/>
+          <p:cNvSpPr>
+            <a:spLocks noGrp="1"/>
+          </p:cNvSpPr>
+          <p:nvPr>
+            <p:ph type="body" idx="1"/>
+          </p:nvPr>
+        </p:nvSpPr>
+        <p:spPr/>
+        <p:txBody>
+          <a:bodyPr/>
+          <a:lstStyle/>
+          <a:p>
+            <a:r>
+              <a:rPr lang="de-DE"/>
+              <a:t>TPU </a:t>
+            </a:r>
+            <a:r>
+              <a:rPr lang="de-DE" dirty="0" err="1"/>
+              <a:t>slower</a:t>
+            </a:r>
+            <a:r>
+              <a:rPr lang="de-DE" dirty="0"/>
+              <a:t>!</a:t>
+            </a:r>
+          </a:p>
+        </p:txBody>
+      </p:sp>
+      <p:sp>
+        <p:nvSpPr>
+          <p:cNvPr id="4" name="Foliennummernplatzhalter 3"/>
+          <p:cNvSpPr>
+            <a:spLocks noGrp="1"/>
+          </p:cNvSpPr>
+          <p:nvPr>
+            <p:ph type="sldNum" sz="quarter" idx="5"/>
+          </p:nvPr>
+        </p:nvSpPr>
+        <p:spPr/>
+        <p:txBody>
+          <a:bodyPr/>
+          <a:lstStyle/>
+          <a:p>
+            <a:pPr>
+              <a:defRPr/>
+            </a:pPr>
+            <a:fld id="{00AFC6D0-44D5-4EB7-828F-6F464F83D79A}" type="slidenum">
+              <a:rPr lang="en-GB" smtClean="0"/>
+              <a:pPr>
+                <a:defRPr/>
+              </a:pPr>
+              <a:t>3</a:t>
+            </a:fld>
+            <a:endParaRPr lang="en-GB"/>
+          </a:p>
+        </p:txBody>
+      </p:sp>
+    </p:spTree>
+    <p:extLst>
+      <p:ext uri="{BB962C8B-B14F-4D97-AF65-F5344CB8AC3E}">
+        <p14:creationId xmlns:p14="http://schemas.microsoft.com/office/powerpoint/2010/main" val="2713535420"/>
+      </p:ext>
+    </p:extLst>
+  </p:cSld>
+  <p:clrMapOvr>
+    <a:masterClrMapping/>
+  </p:clrMapOvr>
+</p:notes>
+</file>
+
 <file path=ppt/slideLayouts/slideLayout1.xml><?xml version="1.0" encoding="utf-8"?>
 <p:sldLayout xmlns:a="http://schemas.openxmlformats.org/drawingml/2006/main" xmlns:r="http://schemas.openxmlformats.org/officeDocument/2006/relationships" xmlns:p="http://schemas.openxmlformats.org/presentationml/2006/main" preserve="1" userDrawn="1">
   <p:cSld name="Start">
@@ -7657,8 +7758,8 @@
         </p:blipFill>
         <p:spPr>
           <a:xfrm>
-            <a:off x="322829" y="1555284"/>
-            <a:ext cx="7262949" cy="1941419"/>
+            <a:off x="29317" y="1480856"/>
+            <a:ext cx="7700554" cy="2058393"/>
           </a:xfrm>
           <a:prstGeom prst="rect">
             <a:avLst/>
@@ -7687,8 +7788,8 @@
         </p:blipFill>
         <p:spPr>
           <a:xfrm>
-            <a:off x="7767257" y="818562"/>
-            <a:ext cx="564443" cy="4036423"/>
+            <a:off x="7729871" y="551202"/>
+            <a:ext cx="601830" cy="4303783"/>
           </a:xfrm>
           <a:prstGeom prst="rect">
             <a:avLst/>
@@ -7971,15 +8072,7 @@
             </a:pPr>
             <a:r>
               <a:rPr lang="en-GB" dirty="0"/>
-              <a:t>For each dataset create </a:t>
-            </a:r>
-            <a:r>
-              <a:rPr lang="en-GB" dirty="0" err="1"/>
-              <a:t>tensorflow</a:t>
-            </a:r>
-            <a:r>
-              <a:rPr lang="en-GB" dirty="0"/>
-              <a:t> dataset loader (using dataset </a:t>
+              <a:t>For each dataset create tensorflow dataset loader (using dataset </a:t>
             </a:r>
             <a:r>
               <a:rPr lang="en-GB" dirty="0" err="1"/>
@@ -8021,12 +8114,26 @@
               <a:buChar char="•"/>
             </a:pPr>
             <a:r>
+              <a:rPr lang="en-GB" dirty="0" err="1">
+                <a:sym typeface="Wingdings" panose="05000000000000000000" pitchFamily="2" charset="2"/>
+              </a:rPr>
+              <a:t>Todo</a:t>
+            </a:r>
+            <a:r>
               <a:rPr lang="en-GB" dirty="0">
                 <a:sym typeface="Wingdings" panose="05000000000000000000" pitchFamily="2" charset="2"/>
               </a:rPr>
-              <a:t>How to shuffle data?</a:t>
-            </a:r>
-            <a:endParaRPr lang="en-GB" noProof="0" dirty="0"/>
+              <a:t>: look into </a:t>
+            </a:r>
+            <a:r>
+              <a:rPr lang="en-GB" dirty="0" err="1">
+                <a:sym typeface="Wingdings" panose="05000000000000000000" pitchFamily="2" charset="2"/>
+              </a:rPr>
+              <a:t>TFRecord</a:t>
+            </a:r>
+            <a:endParaRPr lang="en-GB" noProof="0" dirty="0">
+              <a:sym typeface="Wingdings" panose="05000000000000000000" pitchFamily="2" charset="2"/>
+            </a:endParaRPr>
           </a:p>
         </p:txBody>
       </p:sp>
@@ -8045,7 +8152,7 @@
           <p:nvPr/>
         </p:nvPicPr>
         <p:blipFill>
-          <a:blip r:embed="rId2">
+          <a:blip r:embed="rId3">
             <a:extLst>
               <a:ext uri="{28A0092B-C50C-407E-A947-70E740481C1C}">
                 <a14:useLocalDpi xmlns:a14="http://schemas.microsoft.com/office/drawing/2010/main" val="0"/>

</xml_diff>